<commit_message>
Still some bugs in clustering functions
</commit_message>
<xml_diff>
--- a/latex_sources/imgs/paper_figures.pptx
+++ b/latex_sources/imgs/paper_figures.pptx
@@ -6,12 +6,13 @@
   </p:sldMasterIdLst>
   <p:sldIdLst>
     <p:sldId id="256" r:id="rId2"/>
-    <p:sldId id="257" r:id="rId3"/>
-    <p:sldId id="260" r:id="rId4"/>
-    <p:sldId id="258" r:id="rId5"/>
-    <p:sldId id="261" r:id="rId6"/>
-    <p:sldId id="259" r:id="rId7"/>
-    <p:sldId id="262" r:id="rId8"/>
+    <p:sldId id="263" r:id="rId3"/>
+    <p:sldId id="257" r:id="rId4"/>
+    <p:sldId id="260" r:id="rId5"/>
+    <p:sldId id="258" r:id="rId6"/>
+    <p:sldId id="261" r:id="rId7"/>
+    <p:sldId id="259" r:id="rId8"/>
+    <p:sldId id="262" r:id="rId9"/>
   </p:sldIdLst>
   <p:sldSz cx="12192000" cy="6858000"/>
   <p:notesSz cx="6858000" cy="9144000"/>
@@ -267,7 +268,7 @@
           <a:p>
             <a:fld id="{DBB3036E-A8C8-4911-9E3A-5D714A5792E6}" type="datetimeFigureOut">
               <a:rPr lang="es-ES" smtClean="0"/>
-              <a:t>23/06/2023</a:t>
+              <a:t>26/06/2023</a:t>
             </a:fld>
             <a:endParaRPr lang="es-ES"/>
           </a:p>
@@ -467,7 +468,7 @@
           <a:p>
             <a:fld id="{DBB3036E-A8C8-4911-9E3A-5D714A5792E6}" type="datetimeFigureOut">
               <a:rPr lang="es-ES" smtClean="0"/>
-              <a:t>23/06/2023</a:t>
+              <a:t>26/06/2023</a:t>
             </a:fld>
             <a:endParaRPr lang="es-ES"/>
           </a:p>
@@ -677,7 +678,7 @@
           <a:p>
             <a:fld id="{DBB3036E-A8C8-4911-9E3A-5D714A5792E6}" type="datetimeFigureOut">
               <a:rPr lang="es-ES" smtClean="0"/>
-              <a:t>23/06/2023</a:t>
+              <a:t>26/06/2023</a:t>
             </a:fld>
             <a:endParaRPr lang="es-ES"/>
           </a:p>
@@ -877,7 +878,7 @@
           <a:p>
             <a:fld id="{DBB3036E-A8C8-4911-9E3A-5D714A5792E6}" type="datetimeFigureOut">
               <a:rPr lang="es-ES" smtClean="0"/>
-              <a:t>23/06/2023</a:t>
+              <a:t>26/06/2023</a:t>
             </a:fld>
             <a:endParaRPr lang="es-ES"/>
           </a:p>
@@ -1153,7 +1154,7 @@
           <a:p>
             <a:fld id="{DBB3036E-A8C8-4911-9E3A-5D714A5792E6}" type="datetimeFigureOut">
               <a:rPr lang="es-ES" smtClean="0"/>
-              <a:t>23/06/2023</a:t>
+              <a:t>26/06/2023</a:t>
             </a:fld>
             <a:endParaRPr lang="es-ES"/>
           </a:p>
@@ -1421,7 +1422,7 @@
           <a:p>
             <a:fld id="{DBB3036E-A8C8-4911-9E3A-5D714A5792E6}" type="datetimeFigureOut">
               <a:rPr lang="es-ES" smtClean="0"/>
-              <a:t>23/06/2023</a:t>
+              <a:t>26/06/2023</a:t>
             </a:fld>
             <a:endParaRPr lang="es-ES"/>
           </a:p>
@@ -1836,7 +1837,7 @@
           <a:p>
             <a:fld id="{DBB3036E-A8C8-4911-9E3A-5D714A5792E6}" type="datetimeFigureOut">
               <a:rPr lang="es-ES" smtClean="0"/>
-              <a:t>23/06/2023</a:t>
+              <a:t>26/06/2023</a:t>
             </a:fld>
             <a:endParaRPr lang="es-ES"/>
           </a:p>
@@ -1978,7 +1979,7 @@
           <a:p>
             <a:fld id="{DBB3036E-A8C8-4911-9E3A-5D714A5792E6}" type="datetimeFigureOut">
               <a:rPr lang="es-ES" smtClean="0"/>
-              <a:t>23/06/2023</a:t>
+              <a:t>26/06/2023</a:t>
             </a:fld>
             <a:endParaRPr lang="es-ES"/>
           </a:p>
@@ -2091,7 +2092,7 @@
           <a:p>
             <a:fld id="{DBB3036E-A8C8-4911-9E3A-5D714A5792E6}" type="datetimeFigureOut">
               <a:rPr lang="es-ES" smtClean="0"/>
-              <a:t>23/06/2023</a:t>
+              <a:t>26/06/2023</a:t>
             </a:fld>
             <a:endParaRPr lang="es-ES"/>
           </a:p>
@@ -2404,7 +2405,7 @@
           <a:p>
             <a:fld id="{DBB3036E-A8C8-4911-9E3A-5D714A5792E6}" type="datetimeFigureOut">
               <a:rPr lang="es-ES" smtClean="0"/>
-              <a:t>23/06/2023</a:t>
+              <a:t>26/06/2023</a:t>
             </a:fld>
             <a:endParaRPr lang="es-ES"/>
           </a:p>
@@ -2693,7 +2694,7 @@
           <a:p>
             <a:fld id="{DBB3036E-A8C8-4911-9E3A-5D714A5792E6}" type="datetimeFigureOut">
               <a:rPr lang="es-ES" smtClean="0"/>
-              <a:t>23/06/2023</a:t>
+              <a:t>26/06/2023</a:t>
             </a:fld>
             <a:endParaRPr lang="es-ES"/>
           </a:p>
@@ -2936,7 +2937,7 @@
           <a:p>
             <a:fld id="{DBB3036E-A8C8-4911-9E3A-5D714A5792E6}" type="datetimeFigureOut">
               <a:rPr lang="es-ES" smtClean="0"/>
-              <a:t>23/06/2023</a:t>
+              <a:t>26/06/2023</a:t>
             </a:fld>
             <a:endParaRPr lang="es-ES"/>
           </a:p>
@@ -3460,6 +3461,129 @@
 <file path=ppt/slides/slide2.xml><?xml version="1.0" encoding="utf-8"?>
 <p:sld xmlns:a="http://schemas.openxmlformats.org/drawingml/2006/main" xmlns:r="http://schemas.openxmlformats.org/officeDocument/2006/relationships" xmlns:p="http://schemas.openxmlformats.org/presentationml/2006/main">
   <p:cSld>
+    <p:spTree>
+      <p:nvGrpSpPr>
+        <p:cNvPr id="1" name=""/>
+        <p:cNvGrpSpPr/>
+        <p:nvPr/>
+      </p:nvGrpSpPr>
+      <p:grpSpPr>
+        <a:xfrm>
+          <a:off x="0" y="0"/>
+          <a:ext cx="0" cy="0"/>
+          <a:chOff x="0" y="0"/>
+          <a:chExt cx="0" cy="0"/>
+        </a:xfrm>
+      </p:grpSpPr>
+      <p:grpSp>
+        <p:nvGrpSpPr>
+          <p:cNvPr id="8" name="Group 7">
+            <a:extLst>
+              <a:ext uri="{FF2B5EF4-FFF2-40B4-BE49-F238E27FC236}">
+                <a16:creationId xmlns:a16="http://schemas.microsoft.com/office/drawing/2014/main" id="{1289FB1B-8EE2-5AE2-231A-F3FB2AB234B0}"/>
+              </a:ext>
+            </a:extLst>
+          </p:cNvPr>
+          <p:cNvGrpSpPr/>
+          <p:nvPr/>
+        </p:nvGrpSpPr>
+        <p:grpSpPr>
+          <a:xfrm>
+            <a:off x="0" y="1548069"/>
+            <a:ext cx="13132001" cy="3618000"/>
+            <a:chOff x="0" y="1548069"/>
+            <a:chExt cx="13132001" cy="3618000"/>
+          </a:xfrm>
+        </p:grpSpPr>
+        <p:pic>
+          <p:nvPicPr>
+            <p:cNvPr id="7" name="Picture 6" descr="A picture containing text, screenshot, diagram, line&#10;&#10;Description automatically generated">
+              <a:extLst>
+                <a:ext uri="{FF2B5EF4-FFF2-40B4-BE49-F238E27FC236}">
+                  <a16:creationId xmlns:a16="http://schemas.microsoft.com/office/drawing/2014/main" id="{9BE6E433-A4D2-E7D6-4F1F-3D9BE2E39F6F}"/>
+                </a:ext>
+              </a:extLst>
+            </p:cNvPr>
+            <p:cNvPicPr>
+              <a:picLocks noChangeAspect="1"/>
+            </p:cNvPicPr>
+            <p:nvPr/>
+          </p:nvPicPr>
+          <p:blipFill>
+            <a:blip r:embed="rId2">
+              <a:extLst>
+                <a:ext uri="{28A0092B-C50C-407E-A947-70E740481C1C}">
+                  <a14:useLocalDpi xmlns:a14="http://schemas.microsoft.com/office/drawing/2010/main" val="0"/>
+                </a:ext>
+              </a:extLst>
+            </a:blip>
+            <a:stretch>
+              <a:fillRect/>
+            </a:stretch>
+          </p:blipFill>
+          <p:spPr>
+            <a:xfrm>
+              <a:off x="6293940" y="1548069"/>
+              <a:ext cx="6838061" cy="3618000"/>
+            </a:xfrm>
+            <a:prstGeom prst="rect">
+              <a:avLst/>
+            </a:prstGeom>
+          </p:spPr>
+        </p:pic>
+        <p:pic>
+          <p:nvPicPr>
+            <p:cNvPr id="5" name="Picture 4" descr="A picture containing text, screenshot, number, line&#10;&#10;Description automatically generated">
+              <a:extLst>
+                <a:ext uri="{FF2B5EF4-FFF2-40B4-BE49-F238E27FC236}">
+                  <a16:creationId xmlns:a16="http://schemas.microsoft.com/office/drawing/2014/main" id="{2CFE68CB-59A4-0DB6-8D97-84A8D04231E0}"/>
+                </a:ext>
+              </a:extLst>
+            </p:cNvPr>
+            <p:cNvPicPr>
+              <a:picLocks noChangeAspect="1"/>
+            </p:cNvPicPr>
+            <p:nvPr/>
+          </p:nvPicPr>
+          <p:blipFill>
+            <a:blip r:embed="rId3">
+              <a:extLst>
+                <a:ext uri="{28A0092B-C50C-407E-A947-70E740481C1C}">
+                  <a14:useLocalDpi xmlns:a14="http://schemas.microsoft.com/office/drawing/2010/main" val="0"/>
+                </a:ext>
+              </a:extLst>
+            </a:blip>
+            <a:stretch>
+              <a:fillRect/>
+            </a:stretch>
+          </p:blipFill>
+          <p:spPr>
+            <a:xfrm>
+              <a:off x="0" y="1548069"/>
+              <a:ext cx="6293940" cy="3618000"/>
+            </a:xfrm>
+            <a:prstGeom prst="rect">
+              <a:avLst/>
+            </a:prstGeom>
+          </p:spPr>
+        </p:pic>
+      </p:grpSp>
+    </p:spTree>
+    <p:extLst>
+      <p:ext uri="{BB962C8B-B14F-4D97-AF65-F5344CB8AC3E}">
+        <p14:creationId xmlns:p14="http://schemas.microsoft.com/office/powerpoint/2010/main" val="1521204285"/>
+      </p:ext>
+    </p:extLst>
+  </p:cSld>
+  <p:clrMapOvr>
+    <a:masterClrMapping/>
+  </p:clrMapOvr>
+</p:sld>
+</file>
+
+<file path=ppt/slides/slide3.xml><?xml version="1.0" encoding="utf-8"?>
+<p:sld xmlns:a="http://schemas.openxmlformats.org/drawingml/2006/main" xmlns:r="http://schemas.openxmlformats.org/officeDocument/2006/relationships" xmlns:p="http://schemas.openxmlformats.org/presentationml/2006/main">
+  <p:cSld>
     <p:bg>
       <p:bgPr>
         <a:solidFill>
@@ -3586,7 +3710,7 @@
 </p:sld>
 </file>
 
-<file path=ppt/slides/slide3.xml><?xml version="1.0" encoding="utf-8"?>
+<file path=ppt/slides/slide4.xml><?xml version="1.0" encoding="utf-8"?>
 <p:sld xmlns:a="http://schemas.openxmlformats.org/drawingml/2006/main" xmlns:r="http://schemas.openxmlformats.org/officeDocument/2006/relationships" xmlns:p="http://schemas.openxmlformats.org/presentationml/2006/main">
   <p:cSld>
     <p:spTree>
@@ -3707,7 +3831,7 @@
 </p:sld>
 </file>
 
-<file path=ppt/slides/slide4.xml><?xml version="1.0" encoding="utf-8"?>
+<file path=ppt/slides/slide5.xml><?xml version="1.0" encoding="utf-8"?>
 <p:sld xmlns:a="http://schemas.openxmlformats.org/drawingml/2006/main" xmlns:r="http://schemas.openxmlformats.org/officeDocument/2006/relationships" xmlns:p="http://schemas.openxmlformats.org/presentationml/2006/main">
   <p:cSld>
     <p:spTree>
@@ -3828,7 +3952,7 @@
 </p:sld>
 </file>
 
-<file path=ppt/slides/slide5.xml><?xml version="1.0" encoding="utf-8"?>
+<file path=ppt/slides/slide6.xml><?xml version="1.0" encoding="utf-8"?>
 <p:sld xmlns:a="http://schemas.openxmlformats.org/drawingml/2006/main" xmlns:r="http://schemas.openxmlformats.org/officeDocument/2006/relationships" xmlns:p="http://schemas.openxmlformats.org/presentationml/2006/main">
   <p:cSld>
     <p:spTree>
@@ -3949,7 +4073,7 @@
 </p:sld>
 </file>
 
-<file path=ppt/slides/slide6.xml><?xml version="1.0" encoding="utf-8"?>
+<file path=ppt/slides/slide7.xml><?xml version="1.0" encoding="utf-8"?>
 <p:sld xmlns:a="http://schemas.openxmlformats.org/drawingml/2006/main" xmlns:r="http://schemas.openxmlformats.org/officeDocument/2006/relationships" xmlns:p="http://schemas.openxmlformats.org/presentationml/2006/main">
   <p:cSld>
     <p:spTree>
@@ -4050,7 +4174,7 @@
 </p:sld>
 </file>
 
-<file path=ppt/slides/slide7.xml><?xml version="1.0" encoding="utf-8"?>
+<file path=ppt/slides/slide8.xml><?xml version="1.0" encoding="utf-8"?>
 <p:sld xmlns:a="http://schemas.openxmlformats.org/drawingml/2006/main" xmlns:r="http://schemas.openxmlformats.org/officeDocument/2006/relationships" xmlns:p="http://schemas.openxmlformats.org/presentationml/2006/main">
   <p:cSld>
     <p:spTree>

</xml_diff>

<commit_message>
New dendrogram image, fixed error in notebook
</commit_message>
<xml_diff>
--- a/latex_sources/imgs/paper_figures.pptx
+++ b/latex_sources/imgs/paper_figures.pptx
@@ -13,6 +13,7 @@
     <p:sldId id="261" r:id="rId7"/>
     <p:sldId id="259" r:id="rId8"/>
     <p:sldId id="262" r:id="rId9"/>
+    <p:sldId id="264" r:id="rId10"/>
   </p:sldIdLst>
   <p:sldSz cx="12192000" cy="6858000"/>
   <p:notesSz cx="6858000" cy="9144000"/>
@@ -4297,6 +4298,129 @@
 </p:sld>
 </file>
 
+<file path=ppt/slides/slide9.xml><?xml version="1.0" encoding="utf-8"?>
+<p:sld xmlns:a="http://schemas.openxmlformats.org/drawingml/2006/main" xmlns:r="http://schemas.openxmlformats.org/officeDocument/2006/relationships" xmlns:p="http://schemas.openxmlformats.org/presentationml/2006/main">
+  <p:cSld>
+    <p:spTree>
+      <p:nvGrpSpPr>
+        <p:cNvPr id="1" name=""/>
+        <p:cNvGrpSpPr/>
+        <p:nvPr/>
+      </p:nvGrpSpPr>
+      <p:grpSpPr>
+        <a:xfrm>
+          <a:off x="0" y="0"/>
+          <a:ext cx="0" cy="0"/>
+          <a:chOff x="0" y="0"/>
+          <a:chExt cx="0" cy="0"/>
+        </a:xfrm>
+      </p:grpSpPr>
+      <p:grpSp>
+        <p:nvGrpSpPr>
+          <p:cNvPr id="7" name="Group 6">
+            <a:extLst>
+              <a:ext uri="{FF2B5EF4-FFF2-40B4-BE49-F238E27FC236}">
+                <a16:creationId xmlns:a16="http://schemas.microsoft.com/office/drawing/2014/main" id="{E042E21F-D710-2F3A-C213-E388C4DA2096}"/>
+              </a:ext>
+            </a:extLst>
+          </p:cNvPr>
+          <p:cNvGrpSpPr/>
+          <p:nvPr/>
+        </p:nvGrpSpPr>
+        <p:grpSpPr>
+          <a:xfrm>
+            <a:off x="0" y="1972638"/>
+            <a:ext cx="12079532" cy="3523452"/>
+            <a:chOff x="0" y="1972638"/>
+            <a:chExt cx="12079532" cy="3523452"/>
+          </a:xfrm>
+        </p:grpSpPr>
+        <p:pic>
+          <p:nvPicPr>
+            <p:cNvPr id="3" name="Picture 2" descr="A picture containing screenshot, diagram, line, plot&#10;&#10;Description automatically generated">
+              <a:extLst>
+                <a:ext uri="{FF2B5EF4-FFF2-40B4-BE49-F238E27FC236}">
+                  <a16:creationId xmlns:a16="http://schemas.microsoft.com/office/drawing/2014/main" id="{FA3883E0-2CA1-D3D2-66DA-E558F0A394F5}"/>
+                </a:ext>
+              </a:extLst>
+            </p:cNvPr>
+            <p:cNvPicPr>
+              <a:picLocks noChangeAspect="1"/>
+            </p:cNvPicPr>
+            <p:nvPr/>
+          </p:nvPicPr>
+          <p:blipFill>
+            <a:blip r:embed="rId2">
+              <a:extLst>
+                <a:ext uri="{28A0092B-C50C-407E-A947-70E740481C1C}">
+                  <a14:useLocalDpi xmlns:a14="http://schemas.microsoft.com/office/drawing/2010/main" val="0"/>
+                </a:ext>
+              </a:extLst>
+            </a:blip>
+            <a:stretch>
+              <a:fillRect/>
+            </a:stretch>
+          </p:blipFill>
+          <p:spPr>
+            <a:xfrm>
+              <a:off x="0" y="1972638"/>
+              <a:ext cx="6168016" cy="3519894"/>
+            </a:xfrm>
+            <a:prstGeom prst="rect">
+              <a:avLst/>
+            </a:prstGeom>
+          </p:spPr>
+        </p:pic>
+        <p:pic>
+          <p:nvPicPr>
+            <p:cNvPr id="4" name="Picture 3" descr="A picture containing diagram, line, rectangle, plan&#10;&#10;Description automatically generated">
+              <a:extLst>
+                <a:ext uri="{FF2B5EF4-FFF2-40B4-BE49-F238E27FC236}">
+                  <a16:creationId xmlns:a16="http://schemas.microsoft.com/office/drawing/2014/main" id="{AEF3F0C1-752E-FEBD-FDCF-F31765922463}"/>
+                </a:ext>
+              </a:extLst>
+            </p:cNvPr>
+            <p:cNvPicPr>
+              <a:picLocks noChangeAspect="1"/>
+            </p:cNvPicPr>
+            <p:nvPr/>
+          </p:nvPicPr>
+          <p:blipFill>
+            <a:blip r:embed="rId3">
+              <a:extLst>
+                <a:ext uri="{28A0092B-C50C-407E-A947-70E740481C1C}">
+                  <a14:useLocalDpi xmlns:a14="http://schemas.microsoft.com/office/drawing/2010/main" val="0"/>
+                </a:ext>
+              </a:extLst>
+            </a:blip>
+            <a:stretch>
+              <a:fillRect/>
+            </a:stretch>
+          </p:blipFill>
+          <p:spPr>
+            <a:xfrm>
+              <a:off x="6168016" y="1972638"/>
+              <a:ext cx="5911516" cy="3523452"/>
+            </a:xfrm>
+            <a:prstGeom prst="rect">
+              <a:avLst/>
+            </a:prstGeom>
+          </p:spPr>
+        </p:pic>
+      </p:grpSp>
+    </p:spTree>
+    <p:extLst>
+      <p:ext uri="{BB962C8B-B14F-4D97-AF65-F5344CB8AC3E}">
+        <p14:creationId xmlns:p14="http://schemas.microsoft.com/office/powerpoint/2010/main" val="2453097529"/>
+      </p:ext>
+    </p:extLst>
+  </p:cSld>
+  <p:clrMapOvr>
+    <a:masterClrMapping/>
+  </p:clrMapOvr>
+</p:sld>
+</file>
+
 <file path=ppt/theme/theme1.xml><?xml version="1.0" encoding="utf-8"?>
 <a:theme xmlns:a="http://schemas.openxmlformats.org/drawingml/2006/main" name="Office Theme">
   <a:themeElements>

</xml_diff>

<commit_message>
Improved legend figure 4
</commit_message>
<xml_diff>
--- a/latex_sources/imgs/paper_figures.pptx
+++ b/latex_sources/imgs/paper_figures.pptx
@@ -7,13 +7,14 @@
   <p:sldIdLst>
     <p:sldId id="256" r:id="rId2"/>
     <p:sldId id="263" r:id="rId3"/>
-    <p:sldId id="257" r:id="rId4"/>
-    <p:sldId id="260" r:id="rId5"/>
-    <p:sldId id="258" r:id="rId6"/>
-    <p:sldId id="261" r:id="rId7"/>
-    <p:sldId id="259" r:id="rId8"/>
-    <p:sldId id="262" r:id="rId9"/>
-    <p:sldId id="264" r:id="rId10"/>
+    <p:sldId id="265" r:id="rId4"/>
+    <p:sldId id="257" r:id="rId5"/>
+    <p:sldId id="260" r:id="rId6"/>
+    <p:sldId id="258" r:id="rId7"/>
+    <p:sldId id="261" r:id="rId8"/>
+    <p:sldId id="259" r:id="rId9"/>
+    <p:sldId id="262" r:id="rId10"/>
+    <p:sldId id="264" r:id="rId11"/>
   </p:sldIdLst>
   <p:sldSz cx="12192000" cy="6858000"/>
   <p:notesSz cx="6858000" cy="9144000"/>
@@ -269,7 +270,7 @@
           <a:p>
             <a:fld id="{DBB3036E-A8C8-4911-9E3A-5D714A5792E6}" type="datetimeFigureOut">
               <a:rPr lang="es-ES" smtClean="0"/>
-              <a:t>26/06/2023</a:t>
+              <a:t>27/06/2023</a:t>
             </a:fld>
             <a:endParaRPr lang="es-ES"/>
           </a:p>
@@ -469,7 +470,7 @@
           <a:p>
             <a:fld id="{DBB3036E-A8C8-4911-9E3A-5D714A5792E6}" type="datetimeFigureOut">
               <a:rPr lang="es-ES" smtClean="0"/>
-              <a:t>26/06/2023</a:t>
+              <a:t>27/06/2023</a:t>
             </a:fld>
             <a:endParaRPr lang="es-ES"/>
           </a:p>
@@ -679,7 +680,7 @@
           <a:p>
             <a:fld id="{DBB3036E-A8C8-4911-9E3A-5D714A5792E6}" type="datetimeFigureOut">
               <a:rPr lang="es-ES" smtClean="0"/>
-              <a:t>26/06/2023</a:t>
+              <a:t>27/06/2023</a:t>
             </a:fld>
             <a:endParaRPr lang="es-ES"/>
           </a:p>
@@ -879,7 +880,7 @@
           <a:p>
             <a:fld id="{DBB3036E-A8C8-4911-9E3A-5D714A5792E6}" type="datetimeFigureOut">
               <a:rPr lang="es-ES" smtClean="0"/>
-              <a:t>26/06/2023</a:t>
+              <a:t>27/06/2023</a:t>
             </a:fld>
             <a:endParaRPr lang="es-ES"/>
           </a:p>
@@ -1155,7 +1156,7 @@
           <a:p>
             <a:fld id="{DBB3036E-A8C8-4911-9E3A-5D714A5792E6}" type="datetimeFigureOut">
               <a:rPr lang="es-ES" smtClean="0"/>
-              <a:t>26/06/2023</a:t>
+              <a:t>27/06/2023</a:t>
             </a:fld>
             <a:endParaRPr lang="es-ES"/>
           </a:p>
@@ -1423,7 +1424,7 @@
           <a:p>
             <a:fld id="{DBB3036E-A8C8-4911-9E3A-5D714A5792E6}" type="datetimeFigureOut">
               <a:rPr lang="es-ES" smtClean="0"/>
-              <a:t>26/06/2023</a:t>
+              <a:t>27/06/2023</a:t>
             </a:fld>
             <a:endParaRPr lang="es-ES"/>
           </a:p>
@@ -1838,7 +1839,7 @@
           <a:p>
             <a:fld id="{DBB3036E-A8C8-4911-9E3A-5D714A5792E6}" type="datetimeFigureOut">
               <a:rPr lang="es-ES" smtClean="0"/>
-              <a:t>26/06/2023</a:t>
+              <a:t>27/06/2023</a:t>
             </a:fld>
             <a:endParaRPr lang="es-ES"/>
           </a:p>
@@ -1980,7 +1981,7 @@
           <a:p>
             <a:fld id="{DBB3036E-A8C8-4911-9E3A-5D714A5792E6}" type="datetimeFigureOut">
               <a:rPr lang="es-ES" smtClean="0"/>
-              <a:t>26/06/2023</a:t>
+              <a:t>27/06/2023</a:t>
             </a:fld>
             <a:endParaRPr lang="es-ES"/>
           </a:p>
@@ -2093,7 +2094,7 @@
           <a:p>
             <a:fld id="{DBB3036E-A8C8-4911-9E3A-5D714A5792E6}" type="datetimeFigureOut">
               <a:rPr lang="es-ES" smtClean="0"/>
-              <a:t>26/06/2023</a:t>
+              <a:t>27/06/2023</a:t>
             </a:fld>
             <a:endParaRPr lang="es-ES"/>
           </a:p>
@@ -2406,7 +2407,7 @@
           <a:p>
             <a:fld id="{DBB3036E-A8C8-4911-9E3A-5D714A5792E6}" type="datetimeFigureOut">
               <a:rPr lang="es-ES" smtClean="0"/>
-              <a:t>26/06/2023</a:t>
+              <a:t>27/06/2023</a:t>
             </a:fld>
             <a:endParaRPr lang="es-ES"/>
           </a:p>
@@ -2695,7 +2696,7 @@
           <a:p>
             <a:fld id="{DBB3036E-A8C8-4911-9E3A-5D714A5792E6}" type="datetimeFigureOut">
               <a:rPr lang="es-ES" smtClean="0"/>
-              <a:t>26/06/2023</a:t>
+              <a:t>27/06/2023</a:t>
             </a:fld>
             <a:endParaRPr lang="es-ES"/>
           </a:p>
@@ -2938,7 +2939,7 @@
           <a:p>
             <a:fld id="{DBB3036E-A8C8-4911-9E3A-5D714A5792E6}" type="datetimeFigureOut">
               <a:rPr lang="es-ES" smtClean="0"/>
-              <a:t>26/06/2023</a:t>
+              <a:t>27/06/2023</a:t>
             </a:fld>
             <a:endParaRPr lang="es-ES"/>
           </a:p>
@@ -3459,6 +3460,129 @@
 </p:sld>
 </file>
 
+<file path=ppt/slides/slide10.xml><?xml version="1.0" encoding="utf-8"?>
+<p:sld xmlns:a="http://schemas.openxmlformats.org/drawingml/2006/main" xmlns:r="http://schemas.openxmlformats.org/officeDocument/2006/relationships" xmlns:p="http://schemas.openxmlformats.org/presentationml/2006/main">
+  <p:cSld>
+    <p:spTree>
+      <p:nvGrpSpPr>
+        <p:cNvPr id="1" name=""/>
+        <p:cNvGrpSpPr/>
+        <p:nvPr/>
+      </p:nvGrpSpPr>
+      <p:grpSpPr>
+        <a:xfrm>
+          <a:off x="0" y="0"/>
+          <a:ext cx="0" cy="0"/>
+          <a:chOff x="0" y="0"/>
+          <a:chExt cx="0" cy="0"/>
+        </a:xfrm>
+      </p:grpSpPr>
+      <p:grpSp>
+        <p:nvGrpSpPr>
+          <p:cNvPr id="7" name="Group 6">
+            <a:extLst>
+              <a:ext uri="{FF2B5EF4-FFF2-40B4-BE49-F238E27FC236}">
+                <a16:creationId xmlns:a16="http://schemas.microsoft.com/office/drawing/2014/main" id="{E042E21F-D710-2F3A-C213-E388C4DA2096}"/>
+              </a:ext>
+            </a:extLst>
+          </p:cNvPr>
+          <p:cNvGrpSpPr/>
+          <p:nvPr/>
+        </p:nvGrpSpPr>
+        <p:grpSpPr>
+          <a:xfrm>
+            <a:off x="0" y="1972638"/>
+            <a:ext cx="12079532" cy="3523452"/>
+            <a:chOff x="0" y="1972638"/>
+            <a:chExt cx="12079532" cy="3523452"/>
+          </a:xfrm>
+        </p:grpSpPr>
+        <p:pic>
+          <p:nvPicPr>
+            <p:cNvPr id="3" name="Picture 2" descr="A picture containing screenshot, diagram, line, plot&#10;&#10;Description automatically generated">
+              <a:extLst>
+                <a:ext uri="{FF2B5EF4-FFF2-40B4-BE49-F238E27FC236}">
+                  <a16:creationId xmlns:a16="http://schemas.microsoft.com/office/drawing/2014/main" id="{FA3883E0-2CA1-D3D2-66DA-E558F0A394F5}"/>
+                </a:ext>
+              </a:extLst>
+            </p:cNvPr>
+            <p:cNvPicPr>
+              <a:picLocks noChangeAspect="1"/>
+            </p:cNvPicPr>
+            <p:nvPr/>
+          </p:nvPicPr>
+          <p:blipFill>
+            <a:blip r:embed="rId2">
+              <a:extLst>
+                <a:ext uri="{28A0092B-C50C-407E-A947-70E740481C1C}">
+                  <a14:useLocalDpi xmlns:a14="http://schemas.microsoft.com/office/drawing/2010/main" val="0"/>
+                </a:ext>
+              </a:extLst>
+            </a:blip>
+            <a:stretch>
+              <a:fillRect/>
+            </a:stretch>
+          </p:blipFill>
+          <p:spPr>
+            <a:xfrm>
+              <a:off x="0" y="1972638"/>
+              <a:ext cx="6168016" cy="3519894"/>
+            </a:xfrm>
+            <a:prstGeom prst="rect">
+              <a:avLst/>
+            </a:prstGeom>
+          </p:spPr>
+        </p:pic>
+        <p:pic>
+          <p:nvPicPr>
+            <p:cNvPr id="4" name="Picture 3" descr="A picture containing diagram, line, rectangle, plan&#10;&#10;Description automatically generated">
+              <a:extLst>
+                <a:ext uri="{FF2B5EF4-FFF2-40B4-BE49-F238E27FC236}">
+                  <a16:creationId xmlns:a16="http://schemas.microsoft.com/office/drawing/2014/main" id="{AEF3F0C1-752E-FEBD-FDCF-F31765922463}"/>
+                </a:ext>
+              </a:extLst>
+            </p:cNvPr>
+            <p:cNvPicPr>
+              <a:picLocks noChangeAspect="1"/>
+            </p:cNvPicPr>
+            <p:nvPr/>
+          </p:nvPicPr>
+          <p:blipFill>
+            <a:blip r:embed="rId3">
+              <a:extLst>
+                <a:ext uri="{28A0092B-C50C-407E-A947-70E740481C1C}">
+                  <a14:useLocalDpi xmlns:a14="http://schemas.microsoft.com/office/drawing/2010/main" val="0"/>
+                </a:ext>
+              </a:extLst>
+            </a:blip>
+            <a:stretch>
+              <a:fillRect/>
+            </a:stretch>
+          </p:blipFill>
+          <p:spPr>
+            <a:xfrm>
+              <a:off x="6168016" y="1972638"/>
+              <a:ext cx="5911516" cy="3523452"/>
+            </a:xfrm>
+            <a:prstGeom prst="rect">
+              <a:avLst/>
+            </a:prstGeom>
+          </p:spPr>
+        </p:pic>
+      </p:grpSp>
+    </p:spTree>
+    <p:extLst>
+      <p:ext uri="{BB962C8B-B14F-4D97-AF65-F5344CB8AC3E}">
+        <p14:creationId xmlns:p14="http://schemas.microsoft.com/office/powerpoint/2010/main" val="2453097529"/>
+      </p:ext>
+    </p:extLst>
+  </p:cSld>
+  <p:clrMapOvr>
+    <a:masterClrMapping/>
+  </p:clrMapOvr>
+</p:sld>
+</file>
+
 <file path=ppt/slides/slide2.xml><?xml version="1.0" encoding="utf-8"?>
 <p:sld xmlns:a="http://schemas.openxmlformats.org/drawingml/2006/main" xmlns:r="http://schemas.openxmlformats.org/officeDocument/2006/relationships" xmlns:p="http://schemas.openxmlformats.org/presentationml/2006/main">
   <p:cSld>
@@ -3585,6 +3709,129 @@
 <file path=ppt/slides/slide3.xml><?xml version="1.0" encoding="utf-8"?>
 <p:sld xmlns:a="http://schemas.openxmlformats.org/drawingml/2006/main" xmlns:r="http://schemas.openxmlformats.org/officeDocument/2006/relationships" xmlns:p="http://schemas.openxmlformats.org/presentationml/2006/main">
   <p:cSld>
+    <p:spTree>
+      <p:nvGrpSpPr>
+        <p:cNvPr id="1" name=""/>
+        <p:cNvGrpSpPr/>
+        <p:nvPr/>
+      </p:nvGrpSpPr>
+      <p:grpSpPr>
+        <a:xfrm>
+          <a:off x="0" y="0"/>
+          <a:ext cx="0" cy="0"/>
+          <a:chOff x="0" y="0"/>
+          <a:chExt cx="0" cy="0"/>
+        </a:xfrm>
+      </p:grpSpPr>
+      <p:grpSp>
+        <p:nvGrpSpPr>
+          <p:cNvPr id="8" name="Group 7">
+            <a:extLst>
+              <a:ext uri="{FF2B5EF4-FFF2-40B4-BE49-F238E27FC236}">
+                <a16:creationId xmlns:a16="http://schemas.microsoft.com/office/drawing/2014/main" id="{EE64F9A9-32B3-C9BD-06B2-2AE88FB3A653}"/>
+              </a:ext>
+            </a:extLst>
+          </p:cNvPr>
+          <p:cNvGrpSpPr/>
+          <p:nvPr/>
+        </p:nvGrpSpPr>
+        <p:grpSpPr>
+          <a:xfrm>
+            <a:off x="43219" y="2221288"/>
+            <a:ext cx="12046689" cy="3447992"/>
+            <a:chOff x="43219" y="2221288"/>
+            <a:chExt cx="12046689" cy="3447992"/>
+          </a:xfrm>
+        </p:grpSpPr>
+        <p:pic>
+          <p:nvPicPr>
+            <p:cNvPr id="5" name="Picture 4" descr="A picture containing text, screenshot, number, line&#10;&#10;Description automatically generated">
+              <a:extLst>
+                <a:ext uri="{FF2B5EF4-FFF2-40B4-BE49-F238E27FC236}">
+                  <a16:creationId xmlns:a16="http://schemas.microsoft.com/office/drawing/2014/main" id="{C7D6E18A-7065-7DA8-FF5E-E08C1D5279DC}"/>
+                </a:ext>
+              </a:extLst>
+            </p:cNvPr>
+            <p:cNvPicPr>
+              <a:picLocks noChangeAspect="1"/>
+            </p:cNvPicPr>
+            <p:nvPr/>
+          </p:nvPicPr>
+          <p:blipFill>
+            <a:blip r:embed="rId2">
+              <a:extLst>
+                <a:ext uri="{28A0092B-C50C-407E-A947-70E740481C1C}">
+                  <a14:useLocalDpi xmlns:a14="http://schemas.microsoft.com/office/drawing/2010/main" val="0"/>
+                </a:ext>
+              </a:extLst>
+            </a:blip>
+            <a:stretch>
+              <a:fillRect/>
+            </a:stretch>
+          </p:blipFill>
+          <p:spPr>
+            <a:xfrm>
+              <a:off x="43219" y="2221288"/>
+              <a:ext cx="5766002" cy="3447992"/>
+            </a:xfrm>
+            <a:prstGeom prst="rect">
+              <a:avLst/>
+            </a:prstGeom>
+          </p:spPr>
+        </p:pic>
+        <p:pic>
+          <p:nvPicPr>
+            <p:cNvPr id="7" name="Picture 6" descr="A picture containing text, screenshot, diagram, line&#10;&#10;Description automatically generated">
+              <a:extLst>
+                <a:ext uri="{FF2B5EF4-FFF2-40B4-BE49-F238E27FC236}">
+                  <a16:creationId xmlns:a16="http://schemas.microsoft.com/office/drawing/2014/main" id="{A5D7E3B0-9572-5904-CA39-DEA7762B760C}"/>
+                </a:ext>
+              </a:extLst>
+            </p:cNvPr>
+            <p:cNvPicPr>
+              <a:picLocks noChangeAspect="1"/>
+            </p:cNvPicPr>
+            <p:nvPr/>
+          </p:nvPicPr>
+          <p:blipFill>
+            <a:blip r:embed="rId3">
+              <a:extLst>
+                <a:ext uri="{28A0092B-C50C-407E-A947-70E740481C1C}">
+                  <a14:useLocalDpi xmlns:a14="http://schemas.microsoft.com/office/drawing/2010/main" val="0"/>
+                </a:ext>
+              </a:extLst>
+            </a:blip>
+            <a:stretch>
+              <a:fillRect/>
+            </a:stretch>
+          </p:blipFill>
+          <p:spPr>
+            <a:xfrm>
+              <a:off x="5809221" y="2221288"/>
+              <a:ext cx="6280687" cy="3447992"/>
+            </a:xfrm>
+            <a:prstGeom prst="rect">
+              <a:avLst/>
+            </a:prstGeom>
+          </p:spPr>
+        </p:pic>
+      </p:grpSp>
+    </p:spTree>
+    <p:extLst>
+      <p:ext uri="{BB962C8B-B14F-4D97-AF65-F5344CB8AC3E}">
+        <p14:creationId xmlns:p14="http://schemas.microsoft.com/office/powerpoint/2010/main" val="3318093282"/>
+      </p:ext>
+    </p:extLst>
+  </p:cSld>
+  <p:clrMapOvr>
+    <a:masterClrMapping/>
+  </p:clrMapOvr>
+</p:sld>
+</file>
+
+<file path=ppt/slides/slide4.xml><?xml version="1.0" encoding="utf-8"?>
+<p:sld xmlns:a="http://schemas.openxmlformats.org/drawingml/2006/main" xmlns:r="http://schemas.openxmlformats.org/officeDocument/2006/relationships" xmlns:p="http://schemas.openxmlformats.org/presentationml/2006/main">
+  <p:cSld>
     <p:bg>
       <p:bgPr>
         <a:solidFill>
@@ -3711,7 +3958,7 @@
 </p:sld>
 </file>
 
-<file path=ppt/slides/slide4.xml><?xml version="1.0" encoding="utf-8"?>
+<file path=ppt/slides/slide5.xml><?xml version="1.0" encoding="utf-8"?>
 <p:sld xmlns:a="http://schemas.openxmlformats.org/drawingml/2006/main" xmlns:r="http://schemas.openxmlformats.org/officeDocument/2006/relationships" xmlns:p="http://schemas.openxmlformats.org/presentationml/2006/main">
   <p:cSld>
     <p:spTree>
@@ -3832,7 +4079,7 @@
 </p:sld>
 </file>
 
-<file path=ppt/slides/slide5.xml><?xml version="1.0" encoding="utf-8"?>
+<file path=ppt/slides/slide6.xml><?xml version="1.0" encoding="utf-8"?>
 <p:sld xmlns:a="http://schemas.openxmlformats.org/drawingml/2006/main" xmlns:r="http://schemas.openxmlformats.org/officeDocument/2006/relationships" xmlns:p="http://schemas.openxmlformats.org/presentationml/2006/main">
   <p:cSld>
     <p:spTree>
@@ -3953,7 +4200,7 @@
 </p:sld>
 </file>
 
-<file path=ppt/slides/slide6.xml><?xml version="1.0" encoding="utf-8"?>
+<file path=ppt/slides/slide7.xml><?xml version="1.0" encoding="utf-8"?>
 <p:sld xmlns:a="http://schemas.openxmlformats.org/drawingml/2006/main" xmlns:r="http://schemas.openxmlformats.org/officeDocument/2006/relationships" xmlns:p="http://schemas.openxmlformats.org/presentationml/2006/main">
   <p:cSld>
     <p:spTree>
@@ -4074,7 +4321,7 @@
 </p:sld>
 </file>
 
-<file path=ppt/slides/slide7.xml><?xml version="1.0" encoding="utf-8"?>
+<file path=ppt/slides/slide8.xml><?xml version="1.0" encoding="utf-8"?>
 <p:sld xmlns:a="http://schemas.openxmlformats.org/drawingml/2006/main" xmlns:r="http://schemas.openxmlformats.org/officeDocument/2006/relationships" xmlns:p="http://schemas.openxmlformats.org/presentationml/2006/main">
   <p:cSld>
     <p:spTree>
@@ -4175,7 +4422,7 @@
 </p:sld>
 </file>
 
-<file path=ppt/slides/slide8.xml><?xml version="1.0" encoding="utf-8"?>
+<file path=ppt/slides/slide9.xml><?xml version="1.0" encoding="utf-8"?>
 <p:sld xmlns:a="http://schemas.openxmlformats.org/drawingml/2006/main" xmlns:r="http://schemas.openxmlformats.org/officeDocument/2006/relationships" xmlns:p="http://schemas.openxmlformats.org/presentationml/2006/main">
   <p:cSld>
     <p:spTree>
@@ -4289,129 +4536,6 @@
     <p:extLst>
       <p:ext uri="{BB962C8B-B14F-4D97-AF65-F5344CB8AC3E}">
         <p14:creationId xmlns:p14="http://schemas.microsoft.com/office/powerpoint/2010/main" val="2672047605"/>
-      </p:ext>
-    </p:extLst>
-  </p:cSld>
-  <p:clrMapOvr>
-    <a:masterClrMapping/>
-  </p:clrMapOvr>
-</p:sld>
-</file>
-
-<file path=ppt/slides/slide9.xml><?xml version="1.0" encoding="utf-8"?>
-<p:sld xmlns:a="http://schemas.openxmlformats.org/drawingml/2006/main" xmlns:r="http://schemas.openxmlformats.org/officeDocument/2006/relationships" xmlns:p="http://schemas.openxmlformats.org/presentationml/2006/main">
-  <p:cSld>
-    <p:spTree>
-      <p:nvGrpSpPr>
-        <p:cNvPr id="1" name=""/>
-        <p:cNvGrpSpPr/>
-        <p:nvPr/>
-      </p:nvGrpSpPr>
-      <p:grpSpPr>
-        <a:xfrm>
-          <a:off x="0" y="0"/>
-          <a:ext cx="0" cy="0"/>
-          <a:chOff x="0" y="0"/>
-          <a:chExt cx="0" cy="0"/>
-        </a:xfrm>
-      </p:grpSpPr>
-      <p:grpSp>
-        <p:nvGrpSpPr>
-          <p:cNvPr id="7" name="Group 6">
-            <a:extLst>
-              <a:ext uri="{FF2B5EF4-FFF2-40B4-BE49-F238E27FC236}">
-                <a16:creationId xmlns:a16="http://schemas.microsoft.com/office/drawing/2014/main" id="{E042E21F-D710-2F3A-C213-E388C4DA2096}"/>
-              </a:ext>
-            </a:extLst>
-          </p:cNvPr>
-          <p:cNvGrpSpPr/>
-          <p:nvPr/>
-        </p:nvGrpSpPr>
-        <p:grpSpPr>
-          <a:xfrm>
-            <a:off x="0" y="1972638"/>
-            <a:ext cx="12079532" cy="3523452"/>
-            <a:chOff x="0" y="1972638"/>
-            <a:chExt cx="12079532" cy="3523452"/>
-          </a:xfrm>
-        </p:grpSpPr>
-        <p:pic>
-          <p:nvPicPr>
-            <p:cNvPr id="3" name="Picture 2" descr="A picture containing screenshot, diagram, line, plot&#10;&#10;Description automatically generated">
-              <a:extLst>
-                <a:ext uri="{FF2B5EF4-FFF2-40B4-BE49-F238E27FC236}">
-                  <a16:creationId xmlns:a16="http://schemas.microsoft.com/office/drawing/2014/main" id="{FA3883E0-2CA1-D3D2-66DA-E558F0A394F5}"/>
-                </a:ext>
-              </a:extLst>
-            </p:cNvPr>
-            <p:cNvPicPr>
-              <a:picLocks noChangeAspect="1"/>
-            </p:cNvPicPr>
-            <p:nvPr/>
-          </p:nvPicPr>
-          <p:blipFill>
-            <a:blip r:embed="rId2">
-              <a:extLst>
-                <a:ext uri="{28A0092B-C50C-407E-A947-70E740481C1C}">
-                  <a14:useLocalDpi xmlns:a14="http://schemas.microsoft.com/office/drawing/2010/main" val="0"/>
-                </a:ext>
-              </a:extLst>
-            </a:blip>
-            <a:stretch>
-              <a:fillRect/>
-            </a:stretch>
-          </p:blipFill>
-          <p:spPr>
-            <a:xfrm>
-              <a:off x="0" y="1972638"/>
-              <a:ext cx="6168016" cy="3519894"/>
-            </a:xfrm>
-            <a:prstGeom prst="rect">
-              <a:avLst/>
-            </a:prstGeom>
-          </p:spPr>
-        </p:pic>
-        <p:pic>
-          <p:nvPicPr>
-            <p:cNvPr id="4" name="Picture 3" descr="A picture containing diagram, line, rectangle, plan&#10;&#10;Description automatically generated">
-              <a:extLst>
-                <a:ext uri="{FF2B5EF4-FFF2-40B4-BE49-F238E27FC236}">
-                  <a16:creationId xmlns:a16="http://schemas.microsoft.com/office/drawing/2014/main" id="{AEF3F0C1-752E-FEBD-FDCF-F31765922463}"/>
-                </a:ext>
-              </a:extLst>
-            </p:cNvPr>
-            <p:cNvPicPr>
-              <a:picLocks noChangeAspect="1"/>
-            </p:cNvPicPr>
-            <p:nvPr/>
-          </p:nvPicPr>
-          <p:blipFill>
-            <a:blip r:embed="rId3">
-              <a:extLst>
-                <a:ext uri="{28A0092B-C50C-407E-A947-70E740481C1C}">
-                  <a14:useLocalDpi xmlns:a14="http://schemas.microsoft.com/office/drawing/2010/main" val="0"/>
-                </a:ext>
-              </a:extLst>
-            </a:blip>
-            <a:stretch>
-              <a:fillRect/>
-            </a:stretch>
-          </p:blipFill>
-          <p:spPr>
-            <a:xfrm>
-              <a:off x="6168016" y="1972638"/>
-              <a:ext cx="5911516" cy="3523452"/>
-            </a:xfrm>
-            <a:prstGeom prst="rect">
-              <a:avLst/>
-            </a:prstGeom>
-          </p:spPr>
-        </p:pic>
-      </p:grpSp>
-    </p:spTree>
-    <p:extLst>
-      <p:ext uri="{BB962C8B-B14F-4D97-AF65-F5344CB8AC3E}">
-        <p14:creationId xmlns:p14="http://schemas.microsoft.com/office/powerpoint/2010/main" val="2453097529"/>
       </p:ext>
     </p:extLst>
   </p:cSld>

</xml_diff>